<commit_message>
Finishing the article for performance evaluation
Finishing the article for the performance evaluation Book. Also removed the assets folder  trying to correct the font of the webpage.
</commit_message>
<xml_diff>
--- a/img/portfolio/Performance Book/New Apresentação do Microsoft PowerPoint.pptx
+++ b/img/portfolio/Performance Book/New Apresentação do Microsoft PowerPoint.pptx
@@ -7,6 +7,7 @@
   <p:sldIdLst>
     <p:sldId id="256" r:id="rId2"/>
     <p:sldId id="257" r:id="rId3"/>
+    <p:sldId id="258" r:id="rId4"/>
   </p:sldIdLst>
   <p:sldSz cx="12801600" cy="9601200" type="A3"/>
   <p:notesSz cx="6858000" cy="9144000"/>
@@ -289,7 +290,7 @@
           <a:p>
             <a:fld id="{CCFF29F5-1CEF-4D51-A4B5-96693F2B1431}" type="datetimeFigureOut">
               <a:rPr lang="en-US" smtClean="0"/>
-              <a:t>06-Sep-21</a:t>
+              <a:t>07-Sep-21</a:t>
             </a:fld>
             <a:endParaRPr lang="en-US"/>
           </a:p>
@@ -459,7 +460,7 @@
           <a:p>
             <a:fld id="{CCFF29F5-1CEF-4D51-A4B5-96693F2B1431}" type="datetimeFigureOut">
               <a:rPr lang="en-US" smtClean="0"/>
-              <a:t>06-Sep-21</a:t>
+              <a:t>07-Sep-21</a:t>
             </a:fld>
             <a:endParaRPr lang="en-US"/>
           </a:p>
@@ -639,7 +640,7 @@
           <a:p>
             <a:fld id="{CCFF29F5-1CEF-4D51-A4B5-96693F2B1431}" type="datetimeFigureOut">
               <a:rPr lang="en-US" smtClean="0"/>
-              <a:t>06-Sep-21</a:t>
+              <a:t>07-Sep-21</a:t>
             </a:fld>
             <a:endParaRPr lang="en-US"/>
           </a:p>
@@ -809,7 +810,7 @@
           <a:p>
             <a:fld id="{CCFF29F5-1CEF-4D51-A4B5-96693F2B1431}" type="datetimeFigureOut">
               <a:rPr lang="en-US" smtClean="0"/>
-              <a:t>06-Sep-21</a:t>
+              <a:t>07-Sep-21</a:t>
             </a:fld>
             <a:endParaRPr lang="en-US"/>
           </a:p>
@@ -1055,7 +1056,7 @@
           <a:p>
             <a:fld id="{CCFF29F5-1CEF-4D51-A4B5-96693F2B1431}" type="datetimeFigureOut">
               <a:rPr lang="en-US" smtClean="0"/>
-              <a:t>06-Sep-21</a:t>
+              <a:t>07-Sep-21</a:t>
             </a:fld>
             <a:endParaRPr lang="en-US"/>
           </a:p>
@@ -1343,7 +1344,7 @@
           <a:p>
             <a:fld id="{CCFF29F5-1CEF-4D51-A4B5-96693F2B1431}" type="datetimeFigureOut">
               <a:rPr lang="en-US" smtClean="0"/>
-              <a:t>06-Sep-21</a:t>
+              <a:t>07-Sep-21</a:t>
             </a:fld>
             <a:endParaRPr lang="en-US"/>
           </a:p>
@@ -1765,7 +1766,7 @@
           <a:p>
             <a:fld id="{CCFF29F5-1CEF-4D51-A4B5-96693F2B1431}" type="datetimeFigureOut">
               <a:rPr lang="en-US" smtClean="0"/>
-              <a:t>06-Sep-21</a:t>
+              <a:t>07-Sep-21</a:t>
             </a:fld>
             <a:endParaRPr lang="en-US"/>
           </a:p>
@@ -1883,7 +1884,7 @@
           <a:p>
             <a:fld id="{CCFF29F5-1CEF-4D51-A4B5-96693F2B1431}" type="datetimeFigureOut">
               <a:rPr lang="en-US" smtClean="0"/>
-              <a:t>06-Sep-21</a:t>
+              <a:t>07-Sep-21</a:t>
             </a:fld>
             <a:endParaRPr lang="en-US"/>
           </a:p>
@@ -1978,7 +1979,7 @@
           <a:p>
             <a:fld id="{CCFF29F5-1CEF-4D51-A4B5-96693F2B1431}" type="datetimeFigureOut">
               <a:rPr lang="en-US" smtClean="0"/>
-              <a:t>06-Sep-21</a:t>
+              <a:t>07-Sep-21</a:t>
             </a:fld>
             <a:endParaRPr lang="en-US"/>
           </a:p>
@@ -2255,7 +2256,7 @@
           <a:p>
             <a:fld id="{CCFF29F5-1CEF-4D51-A4B5-96693F2B1431}" type="datetimeFigureOut">
               <a:rPr lang="en-US" smtClean="0"/>
-              <a:t>06-Sep-21</a:t>
+              <a:t>07-Sep-21</a:t>
             </a:fld>
             <a:endParaRPr lang="en-US"/>
           </a:p>
@@ -2508,7 +2509,7 @@
           <a:p>
             <a:fld id="{CCFF29F5-1CEF-4D51-A4B5-96693F2B1431}" type="datetimeFigureOut">
               <a:rPr lang="en-US" smtClean="0"/>
-              <a:t>06-Sep-21</a:t>
+              <a:t>07-Sep-21</a:t>
             </a:fld>
             <a:endParaRPr lang="en-US"/>
           </a:p>
@@ -2721,7 +2722,7 @@
           <a:p>
             <a:fld id="{CCFF29F5-1CEF-4D51-A4B5-96693F2B1431}" type="datetimeFigureOut">
               <a:rPr lang="en-US" smtClean="0"/>
-              <a:t>06-Sep-21</a:t>
+              <a:t>07-Sep-21</a:t>
             </a:fld>
             <a:endParaRPr lang="en-US"/>
           </a:p>
@@ -4037,6 +4038,424 @@
 </p:sld>
 </file>
 
+<file path=ppt/slides/slide3.xml><?xml version="1.0" encoding="utf-8"?>
+<p:sld xmlns:a="http://schemas.openxmlformats.org/drawingml/2006/main" xmlns:r="http://schemas.openxmlformats.org/officeDocument/2006/relationships" xmlns:p="http://schemas.openxmlformats.org/presentationml/2006/main">
+  <p:cSld>
+    <p:spTree>
+      <p:nvGrpSpPr>
+        <p:cNvPr id="1" name=""/>
+        <p:cNvGrpSpPr/>
+        <p:nvPr/>
+      </p:nvGrpSpPr>
+      <p:grpSpPr>
+        <a:xfrm>
+          <a:off x="0" y="0"/>
+          <a:ext cx="0" cy="0"/>
+          <a:chOff x="0" y="0"/>
+          <a:chExt cx="0" cy="0"/>
+        </a:xfrm>
+      </p:grpSpPr>
+      <p:pic>
+        <p:nvPicPr>
+          <p:cNvPr id="1027" name="Picture 3"/>
+          <p:cNvPicPr>
+            <a:picLocks noChangeAspect="1" noChangeArrowheads="1"/>
+          </p:cNvPicPr>
+          <p:nvPr/>
+        </p:nvPicPr>
+        <p:blipFill>
+          <a:blip r:embed="rId2">
+            <a:extLst>
+              <a:ext uri="{28A0092B-C50C-407E-A947-70E740481C1C}">
+                <a14:useLocalDpi xmlns:a14="http://schemas.microsoft.com/office/drawing/2010/main" val="0"/>
+              </a:ext>
+            </a:extLst>
+          </a:blip>
+          <a:srcRect/>
+          <a:stretch>
+            <a:fillRect/>
+          </a:stretch>
+        </p:blipFill>
+        <p:spPr bwMode="auto">
+          <a:xfrm>
+            <a:off x="2227263" y="990600"/>
+            <a:ext cx="9507537" cy="6373813"/>
+          </a:xfrm>
+          <a:prstGeom prst="rect">
+            <a:avLst/>
+          </a:prstGeom>
+          <a:noFill/>
+          <a:ln>
+            <a:noFill/>
+          </a:ln>
+          <a:effectLst/>
+          <a:extLst>
+            <a:ext uri="{909E8E84-426E-40DD-AFC4-6F175D3DCCD1}">
+              <a14:hiddenFill xmlns:a14="http://schemas.microsoft.com/office/drawing/2010/main">
+                <a:solidFill>
+                  <a:schemeClr val="accent1"/>
+                </a:solidFill>
+              </a14:hiddenFill>
+            </a:ext>
+            <a:ext uri="{91240B29-F687-4F45-9708-019B960494DF}">
+              <a14:hiddenLine xmlns:a14="http://schemas.microsoft.com/office/drawing/2010/main" w="9525">
+                <a:solidFill>
+                  <a:schemeClr val="tx1"/>
+                </a:solidFill>
+                <a:miter lim="800000"/>
+                <a:headEnd/>
+                <a:tailEnd/>
+              </a14:hiddenLine>
+            </a:ext>
+            <a:ext uri="{AF507438-7753-43E0-B8FC-AC1667EBCBE1}">
+              <a14:hiddenEffects xmlns:a14="http://schemas.microsoft.com/office/drawing/2010/main">
+                <a:effectLst>
+                  <a:outerShdw dist="35921" dir="2700000" algn="ctr" rotWithShape="0">
+                    <a:schemeClr val="bg2"/>
+                  </a:outerShdw>
+                </a:effectLst>
+              </a14:hiddenEffects>
+            </a:ext>
+          </a:extLst>
+        </p:spPr>
+      </p:pic>
+      <p:sp>
+        <p:nvSpPr>
+          <p:cNvPr id="6" name="Chave esquerda 5"/>
+          <p:cNvSpPr/>
+          <p:nvPr/>
+        </p:nvSpPr>
+        <p:spPr>
+          <a:xfrm>
+            <a:off x="4419600" y="2964739"/>
+            <a:ext cx="344906" cy="2064461"/>
+          </a:xfrm>
+          <a:prstGeom prst="leftBrace">
+            <a:avLst/>
+          </a:prstGeom>
+          <a:ln w="57150">
+            <a:solidFill>
+              <a:schemeClr val="tx1">
+                <a:lumMod val="65000"/>
+                <a:lumOff val="35000"/>
+              </a:schemeClr>
+            </a:solidFill>
+          </a:ln>
+        </p:spPr>
+        <p:style>
+          <a:lnRef idx="1">
+            <a:schemeClr val="accent1"/>
+          </a:lnRef>
+          <a:fillRef idx="0">
+            <a:schemeClr val="accent1"/>
+          </a:fillRef>
+          <a:effectRef idx="0">
+            <a:schemeClr val="accent1"/>
+          </a:effectRef>
+          <a:fontRef idx="minor">
+            <a:schemeClr val="tx1"/>
+          </a:fontRef>
+        </p:style>
+        <p:txBody>
+          <a:bodyPr rtlCol="0" anchor="ctr"/>
+          <a:lstStyle/>
+          <a:p>
+            <a:pPr algn="ctr"/>
+            <a:endParaRPr lang="en-US"/>
+          </a:p>
+        </p:txBody>
+      </p:sp>
+      <p:cxnSp>
+        <p:nvCxnSpPr>
+          <p:cNvPr id="7" name="Conector de seta reta 6"/>
+          <p:cNvCxnSpPr/>
+          <p:nvPr/>
+        </p:nvCxnSpPr>
+        <p:spPr>
+          <a:xfrm flipH="1">
+            <a:off x="5753100" y="7543799"/>
+            <a:ext cx="304800" cy="762000"/>
+          </a:xfrm>
+          <a:prstGeom prst="straightConnector1">
+            <a:avLst/>
+          </a:prstGeom>
+          <a:ln w="57150">
+            <a:solidFill>
+              <a:schemeClr val="tx1">
+                <a:lumMod val="65000"/>
+                <a:lumOff val="35000"/>
+              </a:schemeClr>
+            </a:solidFill>
+            <a:tailEnd type="arrow"/>
+          </a:ln>
+        </p:spPr>
+        <p:style>
+          <a:lnRef idx="1">
+            <a:schemeClr val="accent1"/>
+          </a:lnRef>
+          <a:fillRef idx="0">
+            <a:schemeClr val="accent1"/>
+          </a:fillRef>
+          <a:effectRef idx="0">
+            <a:schemeClr val="accent1"/>
+          </a:effectRef>
+          <a:fontRef idx="minor">
+            <a:schemeClr val="tx1"/>
+          </a:fontRef>
+        </p:style>
+      </p:cxnSp>
+      <p:sp>
+        <p:nvSpPr>
+          <p:cNvPr id="8" name="CaixaDeTexto 7"/>
+          <p:cNvSpPr txBox="1"/>
+          <p:nvPr/>
+        </p:nvSpPr>
+        <p:spPr>
+          <a:xfrm>
+            <a:off x="2556711" y="3673803"/>
+            <a:ext cx="1560094" cy="646331"/>
+          </a:xfrm>
+          <a:prstGeom prst="rect">
+            <a:avLst/>
+          </a:prstGeom>
+          <a:noFill/>
+          <a:ln>
+            <a:solidFill>
+              <a:schemeClr val="tx1">
+                <a:lumMod val="50000"/>
+                <a:lumOff val="50000"/>
+              </a:schemeClr>
+            </a:solidFill>
+          </a:ln>
+        </p:spPr>
+        <p:txBody>
+          <a:bodyPr wrap="square" rtlCol="0">
+            <a:spAutoFit/>
+          </a:bodyPr>
+          <a:lstStyle/>
+          <a:p>
+            <a:r>
+              <a:rPr lang="en-US" sz="1800" b="1" dirty="0" smtClean="0"/>
+              <a:t>Text Reference</a:t>
+            </a:r>
+            <a:endParaRPr lang="en-US" sz="1800" b="1" dirty="0"/>
+          </a:p>
+        </p:txBody>
+      </p:sp>
+      <p:sp>
+        <p:nvSpPr>
+          <p:cNvPr id="9" name="CaixaDeTexto 8"/>
+          <p:cNvSpPr txBox="1"/>
+          <p:nvPr/>
+        </p:nvSpPr>
+        <p:spPr>
+          <a:xfrm>
+            <a:off x="3056022" y="304800"/>
+            <a:ext cx="6926178" cy="584775"/>
+          </a:xfrm>
+          <a:prstGeom prst="rect">
+            <a:avLst/>
+          </a:prstGeom>
+          <a:noFill/>
+          <a:ln>
+            <a:noFill/>
+          </a:ln>
+        </p:spPr>
+        <p:txBody>
+          <a:bodyPr wrap="square" rtlCol="0">
+            <a:spAutoFit/>
+          </a:bodyPr>
+          <a:lstStyle/>
+          <a:p>
+            <a:r>
+              <a:rPr lang="en-US" sz="3200" b="1" u="sng" dirty="0" smtClean="0"/>
+              <a:t>REFERENCE FOR THE QUESTIONNAIRE</a:t>
+            </a:r>
+            <a:endParaRPr lang="en-US" sz="3200" b="1" u="sng" dirty="0"/>
+          </a:p>
+        </p:txBody>
+      </p:sp>
+      <p:sp>
+        <p:nvSpPr>
+          <p:cNvPr id="10" name="Chave esquerda 9"/>
+          <p:cNvSpPr/>
+          <p:nvPr/>
+        </p:nvSpPr>
+        <p:spPr>
+          <a:xfrm rot="16200000">
+            <a:off x="5943600" y="6474993"/>
+            <a:ext cx="228601" cy="2057402"/>
+          </a:xfrm>
+          <a:prstGeom prst="leftBrace">
+            <a:avLst/>
+          </a:prstGeom>
+          <a:ln w="57150">
+            <a:solidFill>
+              <a:schemeClr val="tx1">
+                <a:lumMod val="65000"/>
+                <a:lumOff val="35000"/>
+              </a:schemeClr>
+            </a:solidFill>
+          </a:ln>
+        </p:spPr>
+        <p:style>
+          <a:lnRef idx="1">
+            <a:schemeClr val="accent1"/>
+          </a:lnRef>
+          <a:fillRef idx="0">
+            <a:schemeClr val="accent1"/>
+          </a:fillRef>
+          <a:effectRef idx="0">
+            <a:schemeClr val="accent1"/>
+          </a:effectRef>
+          <a:fontRef idx="minor">
+            <a:schemeClr val="tx1"/>
+          </a:fontRef>
+        </p:style>
+        <p:txBody>
+          <a:bodyPr rtlCol="0" anchor="ctr"/>
+          <a:lstStyle/>
+          <a:p>
+            <a:pPr algn="ctr"/>
+            <a:endParaRPr lang="en-US"/>
+          </a:p>
+        </p:txBody>
+      </p:sp>
+      <p:sp>
+        <p:nvSpPr>
+          <p:cNvPr id="16" name="CaixaDeTexto 15"/>
+          <p:cNvSpPr txBox="1"/>
+          <p:nvPr/>
+        </p:nvSpPr>
+        <p:spPr>
+          <a:xfrm>
+            <a:off x="1028700" y="8439834"/>
+            <a:ext cx="5029200" cy="646331"/>
+          </a:xfrm>
+          <a:prstGeom prst="rect">
+            <a:avLst/>
+          </a:prstGeom>
+          <a:noFill/>
+          <a:ln>
+            <a:solidFill>
+              <a:schemeClr val="tx1">
+                <a:lumMod val="50000"/>
+                <a:lumOff val="50000"/>
+              </a:schemeClr>
+            </a:solidFill>
+          </a:ln>
+        </p:spPr>
+        <p:txBody>
+          <a:bodyPr wrap="square" rtlCol="0">
+            <a:spAutoFit/>
+          </a:bodyPr>
+          <a:lstStyle/>
+          <a:p>
+            <a:r>
+              <a:rPr lang="en-US" sz="1800" b="1" dirty="0" smtClean="0"/>
+              <a:t>Values on this side will be inputted as negative in the weights spreadsheet.</a:t>
+            </a:r>
+            <a:endParaRPr lang="en-US" sz="1800" b="1" dirty="0"/>
+          </a:p>
+        </p:txBody>
+      </p:sp>
+      <p:cxnSp>
+        <p:nvCxnSpPr>
+          <p:cNvPr id="17" name="Conector de seta reta 16"/>
+          <p:cNvCxnSpPr/>
+          <p:nvPr/>
+        </p:nvCxnSpPr>
+        <p:spPr>
+          <a:xfrm flipH="1">
+            <a:off x="3056022" y="5161547"/>
+            <a:ext cx="649704" cy="20053"/>
+          </a:xfrm>
+          <a:prstGeom prst="straightConnector1">
+            <a:avLst/>
+          </a:prstGeom>
+          <a:ln w="57150">
+            <a:solidFill>
+              <a:schemeClr val="tx1">
+                <a:lumMod val="65000"/>
+                <a:lumOff val="35000"/>
+              </a:schemeClr>
+            </a:solidFill>
+            <a:tailEnd type="arrow"/>
+          </a:ln>
+        </p:spPr>
+        <p:style>
+          <a:lnRef idx="1">
+            <a:schemeClr val="accent1"/>
+          </a:lnRef>
+          <a:fillRef idx="0">
+            <a:schemeClr val="accent1"/>
+          </a:fillRef>
+          <a:effectRef idx="0">
+            <a:schemeClr val="accent1"/>
+          </a:effectRef>
+          <a:fontRef idx="minor">
+            <a:schemeClr val="tx1"/>
+          </a:fontRef>
+        </p:style>
+      </p:cxnSp>
+      <p:sp>
+        <p:nvSpPr>
+          <p:cNvPr id="19" name="CaixaDeTexto 18"/>
+          <p:cNvSpPr txBox="1"/>
+          <p:nvPr/>
+        </p:nvSpPr>
+        <p:spPr>
+          <a:xfrm>
+            <a:off x="533400" y="5029200"/>
+            <a:ext cx="2438400" cy="923330"/>
+          </a:xfrm>
+          <a:prstGeom prst="rect">
+            <a:avLst/>
+          </a:prstGeom>
+          <a:noFill/>
+          <a:ln>
+            <a:solidFill>
+              <a:schemeClr val="tx1">
+                <a:lumMod val="50000"/>
+                <a:lumOff val="50000"/>
+              </a:schemeClr>
+            </a:solidFill>
+          </a:ln>
+        </p:spPr>
+        <p:txBody>
+          <a:bodyPr wrap="square" rtlCol="0">
+            <a:spAutoFit/>
+          </a:bodyPr>
+          <a:lstStyle/>
+          <a:p>
+            <a:r>
+              <a:rPr lang="en-US" sz="1800" b="1" dirty="0" smtClean="0"/>
+              <a:t>For each line, the surveyed will select one value.</a:t>
+            </a:r>
+            <a:endParaRPr lang="en-US" sz="1800" b="1" dirty="0"/>
+          </a:p>
+        </p:txBody>
+      </p:sp>
+    </p:spTree>
+    <p:extLst>
+      <p:ext uri="{BB962C8B-B14F-4D97-AF65-F5344CB8AC3E}">
+        <p14:creationId xmlns:p14="http://schemas.microsoft.com/office/powerpoint/2010/main" val="689419603"/>
+      </p:ext>
+    </p:extLst>
+  </p:cSld>
+  <p:clrMapOvr>
+    <a:masterClrMapping/>
+  </p:clrMapOvr>
+  <p:timing>
+    <p:tnLst>
+      <p:par>
+        <p:cTn id="1" dur="indefinite" restart="never" nodeType="tmRoot"/>
+      </p:par>
+    </p:tnLst>
+  </p:timing>
+</p:sld>
+</file>
+
 <file path=ppt/theme/theme1.xml><?xml version="1.0" encoding="utf-8"?>
 <a:theme xmlns:a="http://schemas.openxmlformats.org/drawingml/2006/main" name="Tema do Office">
   <a:themeElements>

</xml_diff>